<commit_message>
adding persistance support for obj name and vertices.
</commit_message>
<xml_diff>
--- a/docs/OBJ to binary structure_20210611_V1.0.pptx
+++ b/docs/OBJ to binary structure_20210611_V1.0.pptx
@@ -8,6 +8,7 @@
     <p:sldId id="256" r:id="rId2"/>
     <p:sldId id="258" r:id="rId3"/>
     <p:sldId id="257" r:id="rId4"/>
+    <p:sldId id="259" r:id="rId5"/>
   </p:sldIdLst>
   <p:sldSz cx="12192000" cy="6858000"/>
   <p:notesSz cx="6858000" cy="9144000"/>
@@ -106,6 +107,11 @@
       </a:defRPr>
     </a:lvl9pPr>
   </p:defaultTextStyle>
+  <p:extLst>
+    <p:ext uri="{EFAFB233-063F-42B5-8137-9DF3F51BA10A}">
+      <p15:sldGuideLst xmlns:p15="http://schemas.microsoft.com/office/powerpoint/2012/main"/>
+    </p:ext>
+  </p:extLst>
 </p:presentation>
 </file>
 
@@ -258,7 +264,7 @@
           <a:p>
             <a:fld id="{B2678478-075C-4254-9D50-CE1E7AF0251E}" type="datetimeFigureOut">
               <a:rPr lang="en-US" smtClean="0"/>
-              <a:t>6/11/2021</a:t>
+              <a:t>6/28/2021</a:t>
             </a:fld>
             <a:endParaRPr lang="en-US"/>
           </a:p>
@@ -458,7 +464,7 @@
           <a:p>
             <a:fld id="{B2678478-075C-4254-9D50-CE1E7AF0251E}" type="datetimeFigureOut">
               <a:rPr lang="en-US" smtClean="0"/>
-              <a:t>6/11/2021</a:t>
+              <a:t>6/28/2021</a:t>
             </a:fld>
             <a:endParaRPr lang="en-US"/>
           </a:p>
@@ -668,7 +674,7 @@
           <a:p>
             <a:fld id="{B2678478-075C-4254-9D50-CE1E7AF0251E}" type="datetimeFigureOut">
               <a:rPr lang="en-US" smtClean="0"/>
-              <a:t>6/11/2021</a:t>
+              <a:t>6/28/2021</a:t>
             </a:fld>
             <a:endParaRPr lang="en-US"/>
           </a:p>
@@ -868,7 +874,7 @@
           <a:p>
             <a:fld id="{B2678478-075C-4254-9D50-CE1E7AF0251E}" type="datetimeFigureOut">
               <a:rPr lang="en-US" smtClean="0"/>
-              <a:t>6/11/2021</a:t>
+              <a:t>6/28/2021</a:t>
             </a:fld>
             <a:endParaRPr lang="en-US"/>
           </a:p>
@@ -1144,7 +1150,7 @@
           <a:p>
             <a:fld id="{B2678478-075C-4254-9D50-CE1E7AF0251E}" type="datetimeFigureOut">
               <a:rPr lang="en-US" smtClean="0"/>
-              <a:t>6/11/2021</a:t>
+              <a:t>6/28/2021</a:t>
             </a:fld>
             <a:endParaRPr lang="en-US"/>
           </a:p>
@@ -1412,7 +1418,7 @@
           <a:p>
             <a:fld id="{B2678478-075C-4254-9D50-CE1E7AF0251E}" type="datetimeFigureOut">
               <a:rPr lang="en-US" smtClean="0"/>
-              <a:t>6/11/2021</a:t>
+              <a:t>6/28/2021</a:t>
             </a:fld>
             <a:endParaRPr lang="en-US"/>
           </a:p>
@@ -1827,7 +1833,7 @@
           <a:p>
             <a:fld id="{B2678478-075C-4254-9D50-CE1E7AF0251E}" type="datetimeFigureOut">
               <a:rPr lang="en-US" smtClean="0"/>
-              <a:t>6/11/2021</a:t>
+              <a:t>6/28/2021</a:t>
             </a:fld>
             <a:endParaRPr lang="en-US"/>
           </a:p>
@@ -1969,7 +1975,7 @@
           <a:p>
             <a:fld id="{B2678478-075C-4254-9D50-CE1E7AF0251E}" type="datetimeFigureOut">
               <a:rPr lang="en-US" smtClean="0"/>
-              <a:t>6/11/2021</a:t>
+              <a:t>6/28/2021</a:t>
             </a:fld>
             <a:endParaRPr lang="en-US"/>
           </a:p>
@@ -2082,7 +2088,7 @@
           <a:p>
             <a:fld id="{B2678478-075C-4254-9D50-CE1E7AF0251E}" type="datetimeFigureOut">
               <a:rPr lang="en-US" smtClean="0"/>
-              <a:t>6/11/2021</a:t>
+              <a:t>6/28/2021</a:t>
             </a:fld>
             <a:endParaRPr lang="en-US"/>
           </a:p>
@@ -2395,7 +2401,7 @@
           <a:p>
             <a:fld id="{B2678478-075C-4254-9D50-CE1E7AF0251E}" type="datetimeFigureOut">
               <a:rPr lang="en-US" smtClean="0"/>
-              <a:t>6/11/2021</a:t>
+              <a:t>6/28/2021</a:t>
             </a:fld>
             <a:endParaRPr lang="en-US"/>
           </a:p>
@@ -2684,7 +2690,7 @@
           <a:p>
             <a:fld id="{B2678478-075C-4254-9D50-CE1E7AF0251E}" type="datetimeFigureOut">
               <a:rPr lang="en-US" smtClean="0"/>
-              <a:t>6/11/2021</a:t>
+              <a:t>6/28/2021</a:t>
             </a:fld>
             <a:endParaRPr lang="en-US"/>
           </a:p>
@@ -2927,7 +2933,7 @@
           <a:p>
             <a:fld id="{B2678478-075C-4254-9D50-CE1E7AF0251E}" type="datetimeFigureOut">
               <a:rPr lang="en-US" smtClean="0"/>
-              <a:t>6/11/2021</a:t>
+              <a:t>6/28/2021</a:t>
             </a:fld>
             <a:endParaRPr lang="en-US"/>
           </a:p>
@@ -4962,6 +4968,458 @@
 </p:sld>
 </file>
 
+<file path=ppt/slides/slide4.xml><?xml version="1.0" encoding="utf-8"?>
+<p:sld xmlns:a="http://schemas.openxmlformats.org/drawingml/2006/main" xmlns:r="http://schemas.openxmlformats.org/officeDocument/2006/relationships" xmlns:p="http://schemas.openxmlformats.org/presentationml/2006/main">
+  <p:cSld>
+    <p:spTree>
+      <p:nvGrpSpPr>
+        <p:cNvPr id="1" name=""/>
+        <p:cNvGrpSpPr/>
+        <p:nvPr/>
+      </p:nvGrpSpPr>
+      <p:grpSpPr>
+        <a:xfrm>
+          <a:off x="0" y="0"/>
+          <a:ext cx="0" cy="0"/>
+          <a:chOff x="0" y="0"/>
+          <a:chExt cx="0" cy="0"/>
+        </a:xfrm>
+      </p:grpSpPr>
+      <p:grpSp>
+        <p:nvGrpSpPr>
+          <p:cNvPr id="4" name="Gruppieren 3">
+            <a:extLst>
+              <a:ext uri="{FF2B5EF4-FFF2-40B4-BE49-F238E27FC236}">
+                <a16:creationId xmlns:a16="http://schemas.microsoft.com/office/drawing/2014/main" id="{DBC92F83-DE6B-4DD6-92B7-2BE6C40473A7}"/>
+              </a:ext>
+            </a:extLst>
+          </p:cNvPr>
+          <p:cNvGrpSpPr/>
+          <p:nvPr/>
+        </p:nvGrpSpPr>
+        <p:grpSpPr>
+          <a:xfrm>
+            <a:off x="594978" y="780176"/>
+            <a:ext cx="4411751" cy="249831"/>
+            <a:chOff x="803187" y="1173480"/>
+            <a:chExt cx="4411751" cy="249831"/>
+          </a:xfrm>
+        </p:grpSpPr>
+        <p:sp>
+          <p:nvSpPr>
+            <p:cNvPr id="5" name="Rechteck 4">
+              <a:extLst>
+                <a:ext uri="{FF2B5EF4-FFF2-40B4-BE49-F238E27FC236}">
+                  <a16:creationId xmlns:a16="http://schemas.microsoft.com/office/drawing/2014/main" id="{198F9C39-F1A7-4A23-B118-D16883A43CCD}"/>
+                </a:ext>
+              </a:extLst>
+            </p:cNvPr>
+            <p:cNvSpPr/>
+            <p:nvPr/>
+          </p:nvSpPr>
+          <p:spPr>
+            <a:xfrm>
+              <a:off x="803187" y="1173480"/>
+              <a:ext cx="4411751" cy="249831"/>
+            </a:xfrm>
+            <a:prstGeom prst="rect">
+              <a:avLst/>
+            </a:prstGeom>
+          </p:spPr>
+          <p:style>
+            <a:lnRef idx="2">
+              <a:schemeClr val="accent1">
+                <a:shade val="50000"/>
+              </a:schemeClr>
+            </a:lnRef>
+            <a:fillRef idx="1">
+              <a:schemeClr val="accent1"/>
+            </a:fillRef>
+            <a:effectRef idx="0">
+              <a:schemeClr val="accent1"/>
+            </a:effectRef>
+            <a:fontRef idx="minor">
+              <a:schemeClr val="lt1"/>
+            </a:fontRef>
+          </p:style>
+          <p:txBody>
+            <a:bodyPr rtlCol="0" anchor="ctr"/>
+            <a:lstStyle/>
+            <a:p>
+              <a:pPr algn="ctr"/>
+              <a:r>
+                <a:rPr lang="en-US" sz="1000" dirty="0"/>
+                <a:t>Obj name</a:t>
+              </a:r>
+            </a:p>
+            <a:p>
+              <a:pPr algn="ctr"/>
+              <a:r>
+                <a:rPr lang="en-US" sz="1000" dirty="0"/>
+                <a:t>&lt;array of signed chars&gt;</a:t>
+              </a:r>
+            </a:p>
+          </p:txBody>
+        </p:sp>
+        <p:sp>
+          <p:nvSpPr>
+            <p:cNvPr id="6" name="Rechteck 5">
+              <a:extLst>
+                <a:ext uri="{FF2B5EF4-FFF2-40B4-BE49-F238E27FC236}">
+                  <a16:creationId xmlns:a16="http://schemas.microsoft.com/office/drawing/2014/main" id="{E2BD51AD-60B7-45DB-BDEC-489F947FB650}"/>
+                </a:ext>
+              </a:extLst>
+            </p:cNvPr>
+            <p:cNvSpPr/>
+            <p:nvPr/>
+          </p:nvSpPr>
+          <p:spPr>
+            <a:xfrm>
+              <a:off x="803187" y="1173480"/>
+              <a:ext cx="692238" cy="249831"/>
+            </a:xfrm>
+            <a:prstGeom prst="rect">
+              <a:avLst/>
+            </a:prstGeom>
+            <a:solidFill>
+              <a:schemeClr val="accent2"/>
+            </a:solidFill>
+          </p:spPr>
+          <p:style>
+            <a:lnRef idx="2">
+              <a:schemeClr val="accent1">
+                <a:shade val="50000"/>
+              </a:schemeClr>
+            </a:lnRef>
+            <a:fillRef idx="1">
+              <a:schemeClr val="accent1"/>
+            </a:fillRef>
+            <a:effectRef idx="0">
+              <a:schemeClr val="accent1"/>
+            </a:effectRef>
+            <a:fontRef idx="minor">
+              <a:schemeClr val="lt1"/>
+            </a:fontRef>
+          </p:style>
+          <p:txBody>
+            <a:bodyPr rtlCol="0" anchor="ctr"/>
+            <a:lstStyle/>
+            <a:p>
+              <a:pPr algn="ctr"/>
+              <a:r>
+                <a:rPr lang="en-US" sz="800" dirty="0"/>
+                <a:t>No of chars</a:t>
+              </a:r>
+              <a:br>
+                <a:rPr lang="en-US" sz="800" dirty="0"/>
+              </a:br>
+              <a:r>
+                <a:rPr lang="en-US" sz="800" dirty="0"/>
+                <a:t>&lt;short&gt;</a:t>
+              </a:r>
+            </a:p>
+          </p:txBody>
+        </p:sp>
+      </p:grpSp>
+      <p:sp>
+        <p:nvSpPr>
+          <p:cNvPr id="7" name="Inhaltsplatzhalter 2">
+            <a:extLst>
+              <a:ext uri="{FF2B5EF4-FFF2-40B4-BE49-F238E27FC236}">
+                <a16:creationId xmlns:a16="http://schemas.microsoft.com/office/drawing/2014/main" id="{54BA9101-8566-4103-B973-DD19ED2B2A83}"/>
+              </a:ext>
+            </a:extLst>
+          </p:cNvPr>
+          <p:cNvSpPr>
+            <a:spLocks noGrp="1"/>
+          </p:cNvSpPr>
+          <p:nvPr>
+            <p:ph idx="1"/>
+          </p:nvPr>
+        </p:nvSpPr>
+        <p:spPr>
+          <a:xfrm>
+            <a:off x="465095" y="313509"/>
+            <a:ext cx="10515600" cy="466667"/>
+          </a:xfrm>
+        </p:spPr>
+        <p:txBody>
+          <a:bodyPr>
+            <a:normAutofit lnSpcReduction="10000"/>
+          </a:bodyPr>
+          <a:lstStyle/>
+          <a:p>
+            <a:r>
+              <a:rPr lang="en-US" dirty="0"/>
+              <a:t>Example:</a:t>
+            </a:r>
+          </a:p>
+        </p:txBody>
+      </p:sp>
+      <p:pic>
+        <p:nvPicPr>
+          <p:cNvPr id="8" name="Grafik 7">
+            <a:extLst>
+              <a:ext uri="{FF2B5EF4-FFF2-40B4-BE49-F238E27FC236}">
+                <a16:creationId xmlns:a16="http://schemas.microsoft.com/office/drawing/2014/main" id="{6D1C4BB9-7965-4E95-8603-BEE327F0D575}"/>
+              </a:ext>
+            </a:extLst>
+          </p:cNvPr>
+          <p:cNvPicPr>
+            <a:picLocks noChangeAspect="1"/>
+          </p:cNvPicPr>
+          <p:nvPr/>
+        </p:nvPicPr>
+        <p:blipFill>
+          <a:blip r:embed="rId2"/>
+          <a:stretch>
+            <a:fillRect/>
+          </a:stretch>
+        </p:blipFill>
+        <p:spPr>
+          <a:xfrm>
+            <a:off x="594978" y="1528133"/>
+            <a:ext cx="3743325" cy="542925"/>
+          </a:xfrm>
+          <a:prstGeom prst="rect">
+            <a:avLst/>
+          </a:prstGeom>
+        </p:spPr>
+      </p:pic>
+      <p:cxnSp>
+        <p:nvCxnSpPr>
+          <p:cNvPr id="10" name="Gerade Verbindung mit Pfeil 9">
+            <a:extLst>
+              <a:ext uri="{FF2B5EF4-FFF2-40B4-BE49-F238E27FC236}">
+                <a16:creationId xmlns:a16="http://schemas.microsoft.com/office/drawing/2014/main" id="{43633585-7D28-4463-BD7C-F6E4CC6D1E25}"/>
+              </a:ext>
+            </a:extLst>
+          </p:cNvPr>
+          <p:cNvCxnSpPr>
+            <a:cxnSpLocks/>
+            <a:endCxn id="11" idx="1"/>
+          </p:cNvCxnSpPr>
+          <p:nvPr/>
+        </p:nvCxnSpPr>
+        <p:spPr>
+          <a:xfrm>
+            <a:off x="941097" y="1030007"/>
+            <a:ext cx="371463" cy="248295"/>
+          </a:xfrm>
+          <a:prstGeom prst="straightConnector1">
+            <a:avLst/>
+          </a:prstGeom>
+          <a:ln>
+            <a:tailEnd type="triangle"/>
+          </a:ln>
+        </p:spPr>
+        <p:style>
+          <a:lnRef idx="1">
+            <a:schemeClr val="accent1"/>
+          </a:lnRef>
+          <a:fillRef idx="0">
+            <a:schemeClr val="accent1"/>
+          </a:fillRef>
+          <a:effectRef idx="0">
+            <a:schemeClr val="accent1"/>
+          </a:effectRef>
+          <a:fontRef idx="minor">
+            <a:schemeClr val="tx1"/>
+          </a:fontRef>
+        </p:style>
+      </p:cxnSp>
+      <p:sp>
+        <p:nvSpPr>
+          <p:cNvPr id="11" name="Geschweifte Klammer rechts 10">
+            <a:extLst>
+              <a:ext uri="{FF2B5EF4-FFF2-40B4-BE49-F238E27FC236}">
+                <a16:creationId xmlns:a16="http://schemas.microsoft.com/office/drawing/2014/main" id="{7C78F01E-0999-4B6C-8877-896881F9AC56}"/>
+              </a:ext>
+            </a:extLst>
+          </p:cNvPr>
+          <p:cNvSpPr/>
+          <p:nvPr/>
+        </p:nvSpPr>
+        <p:spPr>
+          <a:xfrm rot="16200000">
+            <a:off x="1087644" y="785636"/>
+            <a:ext cx="449830" cy="1435161"/>
+          </a:xfrm>
+          <a:prstGeom prst="rightBrace">
+            <a:avLst/>
+          </a:prstGeom>
+        </p:spPr>
+        <p:style>
+          <a:lnRef idx="1">
+            <a:schemeClr val="accent1"/>
+          </a:lnRef>
+          <a:fillRef idx="0">
+            <a:schemeClr val="accent1"/>
+          </a:fillRef>
+          <a:effectRef idx="0">
+            <a:schemeClr val="accent1"/>
+          </a:effectRef>
+          <a:fontRef idx="minor">
+            <a:schemeClr val="tx1"/>
+          </a:fontRef>
+        </p:style>
+        <p:txBody>
+          <a:bodyPr rtlCol="0" anchor="ctr"/>
+          <a:lstStyle/>
+          <a:p>
+            <a:pPr algn="ctr"/>
+            <a:endParaRPr lang="en-US"/>
+          </a:p>
+        </p:txBody>
+      </p:sp>
+      <p:cxnSp>
+        <p:nvCxnSpPr>
+          <p:cNvPr id="13" name="Gerade Verbindung mit Pfeil 12">
+            <a:extLst>
+              <a:ext uri="{FF2B5EF4-FFF2-40B4-BE49-F238E27FC236}">
+                <a16:creationId xmlns:a16="http://schemas.microsoft.com/office/drawing/2014/main" id="{A67DFFB2-944A-4055-BCC0-CF32BC2974E3}"/>
+              </a:ext>
+            </a:extLst>
+          </p:cNvPr>
+          <p:cNvCxnSpPr>
+            <a:cxnSpLocks/>
+            <a:endCxn id="14" idx="1"/>
+          </p:cNvCxnSpPr>
+          <p:nvPr/>
+        </p:nvCxnSpPr>
+        <p:spPr>
+          <a:xfrm>
+            <a:off x="2627027" y="1030006"/>
+            <a:ext cx="589714" cy="114736"/>
+          </a:xfrm>
+          <a:prstGeom prst="straightConnector1">
+            <a:avLst/>
+          </a:prstGeom>
+          <a:ln>
+            <a:tailEnd type="triangle"/>
+          </a:ln>
+        </p:spPr>
+        <p:style>
+          <a:lnRef idx="1">
+            <a:schemeClr val="accent1"/>
+          </a:lnRef>
+          <a:fillRef idx="0">
+            <a:schemeClr val="accent1"/>
+          </a:fillRef>
+          <a:effectRef idx="0">
+            <a:schemeClr val="accent1"/>
+          </a:effectRef>
+          <a:fontRef idx="minor">
+            <a:schemeClr val="tx1"/>
+          </a:fontRef>
+        </p:style>
+      </p:cxnSp>
+      <p:sp>
+        <p:nvSpPr>
+          <p:cNvPr id="14" name="Geschweifte Klammer rechts 13">
+            <a:extLst>
+              <a:ext uri="{FF2B5EF4-FFF2-40B4-BE49-F238E27FC236}">
+                <a16:creationId xmlns:a16="http://schemas.microsoft.com/office/drawing/2014/main" id="{2BAF9F59-6C0D-40F3-9701-63361C13861A}"/>
+              </a:ext>
+            </a:extLst>
+          </p:cNvPr>
+          <p:cNvSpPr/>
+          <p:nvPr/>
+        </p:nvSpPr>
+        <p:spPr>
+          <a:xfrm rot="16200000">
+            <a:off x="2991826" y="248092"/>
+            <a:ext cx="449829" cy="2243128"/>
+          </a:xfrm>
+          <a:prstGeom prst="rightBrace">
+            <a:avLst/>
+          </a:prstGeom>
+        </p:spPr>
+        <p:style>
+          <a:lnRef idx="1">
+            <a:schemeClr val="accent1"/>
+          </a:lnRef>
+          <a:fillRef idx="0">
+            <a:schemeClr val="accent1"/>
+          </a:fillRef>
+          <a:effectRef idx="0">
+            <a:schemeClr val="accent1"/>
+          </a:effectRef>
+          <a:fontRef idx="minor">
+            <a:schemeClr val="tx1"/>
+          </a:fontRef>
+        </p:style>
+        <p:txBody>
+          <a:bodyPr rtlCol="0" anchor="ctr"/>
+          <a:lstStyle/>
+          <a:p>
+            <a:pPr algn="ctr"/>
+            <a:endParaRPr lang="en-US"/>
+          </a:p>
+        </p:txBody>
+      </p:sp>
+      <p:sp>
+        <p:nvSpPr>
+          <p:cNvPr id="16" name="Textfeld 15">
+            <a:extLst>
+              <a:ext uri="{FF2B5EF4-FFF2-40B4-BE49-F238E27FC236}">
+                <a16:creationId xmlns:a16="http://schemas.microsoft.com/office/drawing/2014/main" id="{76B0E476-1338-45F5-B3B4-DC8DDE243884}"/>
+              </a:ext>
+            </a:extLst>
+          </p:cNvPr>
+          <p:cNvSpPr txBox="1"/>
+          <p:nvPr/>
+        </p:nvSpPr>
+        <p:spPr>
+          <a:xfrm>
+            <a:off x="4714613" y="1369656"/>
+            <a:ext cx="4411751" cy="646331"/>
+          </a:xfrm>
+          <a:prstGeom prst="rect">
+            <a:avLst/>
+          </a:prstGeom>
+          <a:noFill/>
+        </p:spPr>
+        <p:txBody>
+          <a:bodyPr wrap="square" rtlCol="0">
+            <a:spAutoFit/>
+          </a:bodyPr>
+          <a:lstStyle/>
+          <a:p>
+            <a:pPr marL="285750" indent="-285750">
+              <a:buFontTx/>
+              <a:buChar char="-"/>
+            </a:pPr>
+            <a:r>
+              <a:rPr lang="en-US" dirty="0"/>
+              <a:t>6 characters (including NULL termination)</a:t>
+            </a:r>
+          </a:p>
+          <a:p>
+            <a:pPr marL="285750" indent="-285750">
+              <a:buFontTx/>
+              <a:buChar char="-"/>
+            </a:pPr>
+            <a:r>
+              <a:rPr lang="en-US" dirty="0"/>
+              <a:t>The 5+1 characters are “ju-87”</a:t>
+            </a:r>
+          </a:p>
+        </p:txBody>
+      </p:sp>
+    </p:spTree>
+    <p:extLst>
+      <p:ext uri="{BB962C8B-B14F-4D97-AF65-F5344CB8AC3E}">
+        <p14:creationId xmlns:p14="http://schemas.microsoft.com/office/powerpoint/2010/main" val="1322001003"/>
+      </p:ext>
+    </p:extLst>
+  </p:cSld>
+  <p:clrMapOvr>
+    <a:masterClrMapping/>
+  </p:clrMapOvr>
+</p:sld>
+</file>
+
 <file path=ppt/theme/theme1.xml><?xml version="1.0" encoding="utf-8"?>
 <a:theme xmlns:a="http://schemas.openxmlformats.org/drawingml/2006/main" name="Office">
   <a:themeElements>

</xml_diff>

<commit_message>
Create a sub-string search class inside of a line. Still on going...
</commit_message>
<xml_diff>
--- a/docs/OBJ to binary structure_20210611_V1.0.pptx
+++ b/docs/OBJ to binary structure_20210611_V1.0.pptx
@@ -264,7 +264,7 @@
           <a:p>
             <a:fld id="{B2678478-075C-4254-9D50-CE1E7AF0251E}" type="datetimeFigureOut">
               <a:rPr lang="en-US" smtClean="0"/>
-              <a:t>6/28/2021</a:t>
+              <a:t>6/29/2021</a:t>
             </a:fld>
             <a:endParaRPr lang="en-US"/>
           </a:p>
@@ -464,7 +464,7 @@
           <a:p>
             <a:fld id="{B2678478-075C-4254-9D50-CE1E7AF0251E}" type="datetimeFigureOut">
               <a:rPr lang="en-US" smtClean="0"/>
-              <a:t>6/28/2021</a:t>
+              <a:t>6/29/2021</a:t>
             </a:fld>
             <a:endParaRPr lang="en-US"/>
           </a:p>
@@ -674,7 +674,7 @@
           <a:p>
             <a:fld id="{B2678478-075C-4254-9D50-CE1E7AF0251E}" type="datetimeFigureOut">
               <a:rPr lang="en-US" smtClean="0"/>
-              <a:t>6/28/2021</a:t>
+              <a:t>6/29/2021</a:t>
             </a:fld>
             <a:endParaRPr lang="en-US"/>
           </a:p>
@@ -874,7 +874,7 @@
           <a:p>
             <a:fld id="{B2678478-075C-4254-9D50-CE1E7AF0251E}" type="datetimeFigureOut">
               <a:rPr lang="en-US" smtClean="0"/>
-              <a:t>6/28/2021</a:t>
+              <a:t>6/29/2021</a:t>
             </a:fld>
             <a:endParaRPr lang="en-US"/>
           </a:p>
@@ -1150,7 +1150,7 @@
           <a:p>
             <a:fld id="{B2678478-075C-4254-9D50-CE1E7AF0251E}" type="datetimeFigureOut">
               <a:rPr lang="en-US" smtClean="0"/>
-              <a:t>6/28/2021</a:t>
+              <a:t>6/29/2021</a:t>
             </a:fld>
             <a:endParaRPr lang="en-US"/>
           </a:p>
@@ -1418,7 +1418,7 @@
           <a:p>
             <a:fld id="{B2678478-075C-4254-9D50-CE1E7AF0251E}" type="datetimeFigureOut">
               <a:rPr lang="en-US" smtClean="0"/>
-              <a:t>6/28/2021</a:t>
+              <a:t>6/29/2021</a:t>
             </a:fld>
             <a:endParaRPr lang="en-US"/>
           </a:p>
@@ -1833,7 +1833,7 @@
           <a:p>
             <a:fld id="{B2678478-075C-4254-9D50-CE1E7AF0251E}" type="datetimeFigureOut">
               <a:rPr lang="en-US" smtClean="0"/>
-              <a:t>6/28/2021</a:t>
+              <a:t>6/29/2021</a:t>
             </a:fld>
             <a:endParaRPr lang="en-US"/>
           </a:p>
@@ -1975,7 +1975,7 @@
           <a:p>
             <a:fld id="{B2678478-075C-4254-9D50-CE1E7AF0251E}" type="datetimeFigureOut">
               <a:rPr lang="en-US" smtClean="0"/>
-              <a:t>6/28/2021</a:t>
+              <a:t>6/29/2021</a:t>
             </a:fld>
             <a:endParaRPr lang="en-US"/>
           </a:p>
@@ -2088,7 +2088,7 @@
           <a:p>
             <a:fld id="{B2678478-075C-4254-9D50-CE1E7AF0251E}" type="datetimeFigureOut">
               <a:rPr lang="en-US" smtClean="0"/>
-              <a:t>6/28/2021</a:t>
+              <a:t>6/29/2021</a:t>
             </a:fld>
             <a:endParaRPr lang="en-US"/>
           </a:p>
@@ -2401,7 +2401,7 @@
           <a:p>
             <a:fld id="{B2678478-075C-4254-9D50-CE1E7AF0251E}" type="datetimeFigureOut">
               <a:rPr lang="en-US" smtClean="0"/>
-              <a:t>6/28/2021</a:t>
+              <a:t>6/29/2021</a:t>
             </a:fld>
             <a:endParaRPr lang="en-US"/>
           </a:p>
@@ -2690,7 +2690,7 @@
           <a:p>
             <a:fld id="{B2678478-075C-4254-9D50-CE1E7AF0251E}" type="datetimeFigureOut">
               <a:rPr lang="en-US" smtClean="0"/>
-              <a:t>6/28/2021</a:t>
+              <a:t>6/29/2021</a:t>
             </a:fld>
             <a:endParaRPr lang="en-US"/>
           </a:p>
@@ -2933,7 +2933,7 @@
           <a:p>
             <a:fld id="{B2678478-075C-4254-9D50-CE1E7AF0251E}" type="datetimeFigureOut">
               <a:rPr lang="en-US" smtClean="0"/>
-              <a:t>6/28/2021</a:t>
+              <a:t>6/29/2021</a:t>
             </a:fld>
             <a:endParaRPr lang="en-US"/>
           </a:p>
@@ -3396,7 +3396,9 @@
         </p:nvSpPr>
         <p:spPr/>
         <p:txBody>
-          <a:bodyPr/>
+          <a:bodyPr>
+            <a:normAutofit/>
+          </a:bodyPr>
           <a:lstStyle/>
           <a:p>
             <a:r>
@@ -3408,6 +3410,12 @@
             <a:r>
               <a:rPr lang="en-US" dirty="0"/>
               <a:t>V1.0</a:t>
+            </a:r>
+          </a:p>
+          <a:p>
+            <a:r>
+              <a:rPr lang="en-US" dirty="0"/>
+              <a:t>G. Dumitra</a:t>
             </a:r>
           </a:p>
         </p:txBody>
@@ -5403,6 +5411,177 @@
             <a:r>
               <a:rPr lang="en-US" dirty="0"/>
               <a:t>The 5+1 characters are “ju-87”</a:t>
+            </a:r>
+          </a:p>
+        </p:txBody>
+      </p:sp>
+      <p:sp>
+        <p:nvSpPr>
+          <p:cNvPr id="12" name="Rechteck 11">
+            <a:extLst>
+              <a:ext uri="{FF2B5EF4-FFF2-40B4-BE49-F238E27FC236}">
+                <a16:creationId xmlns:a16="http://schemas.microsoft.com/office/drawing/2014/main" id="{E0AB06E3-3E57-4B35-AAD1-DD62D45190FB}"/>
+              </a:ext>
+            </a:extLst>
+          </p:cNvPr>
+          <p:cNvSpPr/>
+          <p:nvPr/>
+        </p:nvSpPr>
+        <p:spPr>
+          <a:xfrm>
+            <a:off x="2458255" y="2586491"/>
+            <a:ext cx="1724112" cy="293614"/>
+          </a:xfrm>
+          <a:prstGeom prst="rect">
+            <a:avLst/>
+          </a:prstGeom>
+        </p:spPr>
+        <p:style>
+          <a:lnRef idx="2">
+            <a:schemeClr val="accent1">
+              <a:shade val="50000"/>
+            </a:schemeClr>
+          </a:lnRef>
+          <a:fillRef idx="1">
+            <a:schemeClr val="accent1"/>
+          </a:fillRef>
+          <a:effectRef idx="0">
+            <a:schemeClr val="accent1"/>
+          </a:effectRef>
+          <a:fontRef idx="minor">
+            <a:schemeClr val="lt1"/>
+          </a:fontRef>
+        </p:style>
+        <p:txBody>
+          <a:bodyPr rtlCol="0" anchor="ctr"/>
+          <a:lstStyle/>
+          <a:p>
+            <a:pPr algn="ctr"/>
+            <a:r>
+              <a:rPr lang="en-US" sz="1000" dirty="0"/>
+              <a:t>No of triangles units (green)</a:t>
+            </a:r>
+            <a:br>
+              <a:rPr lang="en-US" sz="1000" dirty="0"/>
+            </a:br>
+            <a:r>
+              <a:rPr lang="en-US" sz="1000" dirty="0"/>
+              <a:t>&lt;signed short&gt;</a:t>
+            </a:r>
+          </a:p>
+        </p:txBody>
+      </p:sp>
+      <p:pic>
+        <p:nvPicPr>
+          <p:cNvPr id="2" name="Grafik 1">
+            <a:extLst>
+              <a:ext uri="{FF2B5EF4-FFF2-40B4-BE49-F238E27FC236}">
+                <a16:creationId xmlns:a16="http://schemas.microsoft.com/office/drawing/2014/main" id="{E60A98F1-D0AE-4FDD-8B65-1D5C27F20C88}"/>
+              </a:ext>
+            </a:extLst>
+          </p:cNvPr>
+          <p:cNvPicPr>
+            <a:picLocks noChangeAspect="1"/>
+          </p:cNvPicPr>
+          <p:nvPr/>
+        </p:nvPicPr>
+        <p:blipFill>
+          <a:blip r:embed="rId3"/>
+          <a:stretch>
+            <a:fillRect/>
+          </a:stretch>
+        </p:blipFill>
+        <p:spPr>
+          <a:xfrm>
+            <a:off x="594978" y="2634005"/>
+            <a:ext cx="1514475" cy="523875"/>
+          </a:xfrm>
+          <a:prstGeom prst="rect">
+            <a:avLst/>
+          </a:prstGeom>
+        </p:spPr>
+      </p:pic>
+      <p:cxnSp>
+        <p:nvCxnSpPr>
+          <p:cNvPr id="9" name="Verbinder: gewinkelt 8">
+            <a:extLst>
+              <a:ext uri="{FF2B5EF4-FFF2-40B4-BE49-F238E27FC236}">
+                <a16:creationId xmlns:a16="http://schemas.microsoft.com/office/drawing/2014/main" id="{F4AB1162-E67D-43C6-91D1-F4D74C766DDA}"/>
+              </a:ext>
+            </a:extLst>
+          </p:cNvPr>
+          <p:cNvCxnSpPr>
+            <a:stCxn id="8" idx="3"/>
+            <a:endCxn id="2" idx="1"/>
+          </p:cNvCxnSpPr>
+          <p:nvPr/>
+        </p:nvCxnSpPr>
+        <p:spPr>
+          <a:xfrm flipH="1">
+            <a:off x="594978" y="1799596"/>
+            <a:ext cx="3743325" cy="1096347"/>
+          </a:xfrm>
+          <a:prstGeom prst="bentConnector5">
+            <a:avLst>
+              <a:gd name="adj1" fmla="val -6107"/>
+              <a:gd name="adj2" fmla="val 50434"/>
+              <a:gd name="adj3" fmla="val 106107"/>
+            </a:avLst>
+          </a:prstGeom>
+          <a:ln>
+            <a:tailEnd type="triangle"/>
+          </a:ln>
+        </p:spPr>
+        <p:style>
+          <a:lnRef idx="1">
+            <a:schemeClr val="accent1"/>
+          </a:lnRef>
+          <a:fillRef idx="0">
+            <a:schemeClr val="accent1"/>
+          </a:fillRef>
+          <a:effectRef idx="0">
+            <a:schemeClr val="accent1"/>
+          </a:effectRef>
+          <a:fontRef idx="minor">
+            <a:schemeClr val="tx1"/>
+          </a:fontRef>
+        </p:style>
+      </p:cxnSp>
+      <p:sp>
+        <p:nvSpPr>
+          <p:cNvPr id="17" name="Textfeld 16">
+            <a:extLst>
+              <a:ext uri="{FF2B5EF4-FFF2-40B4-BE49-F238E27FC236}">
+                <a16:creationId xmlns:a16="http://schemas.microsoft.com/office/drawing/2014/main" id="{B6013647-CE24-472A-B698-9436668F6189}"/>
+              </a:ext>
+            </a:extLst>
+          </p:cNvPr>
+          <p:cNvSpPr txBox="1"/>
+          <p:nvPr/>
+        </p:nvSpPr>
+        <p:spPr>
+          <a:xfrm>
+            <a:off x="4791512" y="2634005"/>
+            <a:ext cx="4411751" cy="369332"/>
+          </a:xfrm>
+          <a:prstGeom prst="rect">
+            <a:avLst/>
+          </a:prstGeom>
+          <a:noFill/>
+        </p:spPr>
+        <p:txBody>
+          <a:bodyPr wrap="square" rtlCol="0">
+            <a:spAutoFit/>
+          </a:bodyPr>
+          <a:lstStyle/>
+          <a:p>
+            <a:pPr marL="285750" indent="-285750">
+              <a:buFontTx/>
+              <a:buChar char="-"/>
+            </a:pPr>
+            <a:r>
+              <a:rPr lang="en-US" dirty="0"/>
+              <a:t>The “ju-87” object has 5706 triangles </a:t>
             </a:r>
           </a:p>
         </p:txBody>

</xml_diff>

<commit_message>
updating the OBJ parser..on work the MTL parser
</commit_message>
<xml_diff>
--- a/docs/OBJ to binary structure_20210611_V1.0.pptx
+++ b/docs/OBJ to binary structure_20210611_V1.0.pptx
@@ -264,7 +264,7 @@
           <a:p>
             <a:fld id="{B2678478-075C-4254-9D50-CE1E7AF0251E}" type="datetimeFigureOut">
               <a:rPr lang="en-US" smtClean="0"/>
-              <a:t>6/29/2021</a:t>
+              <a:t>7/2/2021</a:t>
             </a:fld>
             <a:endParaRPr lang="en-US"/>
           </a:p>
@@ -464,7 +464,7 @@
           <a:p>
             <a:fld id="{B2678478-075C-4254-9D50-CE1E7AF0251E}" type="datetimeFigureOut">
               <a:rPr lang="en-US" smtClean="0"/>
-              <a:t>6/29/2021</a:t>
+              <a:t>7/2/2021</a:t>
             </a:fld>
             <a:endParaRPr lang="en-US"/>
           </a:p>
@@ -674,7 +674,7 @@
           <a:p>
             <a:fld id="{B2678478-075C-4254-9D50-CE1E7AF0251E}" type="datetimeFigureOut">
               <a:rPr lang="en-US" smtClean="0"/>
-              <a:t>6/29/2021</a:t>
+              <a:t>7/2/2021</a:t>
             </a:fld>
             <a:endParaRPr lang="en-US"/>
           </a:p>
@@ -874,7 +874,7 @@
           <a:p>
             <a:fld id="{B2678478-075C-4254-9D50-CE1E7AF0251E}" type="datetimeFigureOut">
               <a:rPr lang="en-US" smtClean="0"/>
-              <a:t>6/29/2021</a:t>
+              <a:t>7/2/2021</a:t>
             </a:fld>
             <a:endParaRPr lang="en-US"/>
           </a:p>
@@ -1150,7 +1150,7 @@
           <a:p>
             <a:fld id="{B2678478-075C-4254-9D50-CE1E7AF0251E}" type="datetimeFigureOut">
               <a:rPr lang="en-US" smtClean="0"/>
-              <a:t>6/29/2021</a:t>
+              <a:t>7/2/2021</a:t>
             </a:fld>
             <a:endParaRPr lang="en-US"/>
           </a:p>
@@ -1418,7 +1418,7 @@
           <a:p>
             <a:fld id="{B2678478-075C-4254-9D50-CE1E7AF0251E}" type="datetimeFigureOut">
               <a:rPr lang="en-US" smtClean="0"/>
-              <a:t>6/29/2021</a:t>
+              <a:t>7/2/2021</a:t>
             </a:fld>
             <a:endParaRPr lang="en-US"/>
           </a:p>
@@ -1833,7 +1833,7 @@
           <a:p>
             <a:fld id="{B2678478-075C-4254-9D50-CE1E7AF0251E}" type="datetimeFigureOut">
               <a:rPr lang="en-US" smtClean="0"/>
-              <a:t>6/29/2021</a:t>
+              <a:t>7/2/2021</a:t>
             </a:fld>
             <a:endParaRPr lang="en-US"/>
           </a:p>
@@ -1975,7 +1975,7 @@
           <a:p>
             <a:fld id="{B2678478-075C-4254-9D50-CE1E7AF0251E}" type="datetimeFigureOut">
               <a:rPr lang="en-US" smtClean="0"/>
-              <a:t>6/29/2021</a:t>
+              <a:t>7/2/2021</a:t>
             </a:fld>
             <a:endParaRPr lang="en-US"/>
           </a:p>
@@ -2088,7 +2088,7 @@
           <a:p>
             <a:fld id="{B2678478-075C-4254-9D50-CE1E7AF0251E}" type="datetimeFigureOut">
               <a:rPr lang="en-US" smtClean="0"/>
-              <a:t>6/29/2021</a:t>
+              <a:t>7/2/2021</a:t>
             </a:fld>
             <a:endParaRPr lang="en-US"/>
           </a:p>
@@ -2401,7 +2401,7 @@
           <a:p>
             <a:fld id="{B2678478-075C-4254-9D50-CE1E7AF0251E}" type="datetimeFigureOut">
               <a:rPr lang="en-US" smtClean="0"/>
-              <a:t>6/29/2021</a:t>
+              <a:t>7/2/2021</a:t>
             </a:fld>
             <a:endParaRPr lang="en-US"/>
           </a:p>
@@ -2690,7 +2690,7 @@
           <a:p>
             <a:fld id="{B2678478-075C-4254-9D50-CE1E7AF0251E}" type="datetimeFigureOut">
               <a:rPr lang="en-US" smtClean="0"/>
-              <a:t>6/29/2021</a:t>
+              <a:t>7/2/2021</a:t>
             </a:fld>
             <a:endParaRPr lang="en-US"/>
           </a:p>
@@ -2933,7 +2933,7 @@
           <a:p>
             <a:fld id="{B2678478-075C-4254-9D50-CE1E7AF0251E}" type="datetimeFigureOut">
               <a:rPr lang="en-US" smtClean="0"/>
-              <a:t>6/29/2021</a:t>
+              <a:t>7/2/2021</a:t>
             </a:fld>
             <a:endParaRPr lang="en-US"/>
           </a:p>
@@ -3640,7 +3640,7 @@
         <p:spPr>
           <a:xfrm>
             <a:off x="511088" y="1129697"/>
-            <a:ext cx="1724112" cy="293614"/>
+            <a:ext cx="2097888" cy="293614"/>
           </a:xfrm>
           <a:prstGeom prst="rect">
             <a:avLst/>
@@ -3669,14 +3669,14 @@
             <a:pPr algn="ctr"/>
             <a:r>
               <a:rPr lang="en-US" sz="1000" dirty="0"/>
-              <a:t>No of triangles units (green)</a:t>
+              <a:t>No of triangles/faces units </a:t>
             </a:r>
             <a:br>
               <a:rPr lang="en-US" sz="1000" dirty="0"/>
             </a:br>
             <a:r>
               <a:rPr lang="en-US" sz="1000" dirty="0"/>
-              <a:t>&lt;signed short&gt;</a:t>
+              <a:t>&lt;signed int&gt;</a:t>
             </a:r>
           </a:p>
         </p:txBody>
@@ -4733,8 +4733,13 @@
               </a:br>
               <a:r>
                 <a:rPr lang="en-US" sz="800" dirty="0"/>
-                <a:t>&lt;short&gt;</a:t>
+                <a:t>&lt;</a:t>
               </a:r>
+              <a:r>
+                <a:rPr lang="en-US" sz="800"/>
+                <a:t>signed int&gt;</a:t>
+              </a:r>
+              <a:endParaRPr lang="en-US" sz="800" dirty="0"/>
             </a:p>
           </p:txBody>
         </p:sp>

</xml_diff>